<commit_message>
add comments in the doc and read me
</commit_message>
<xml_diff>
--- a/documentation.pptx
+++ b/documentation.pptx
@@ -10045,7 +10045,7 @@
         <p:spPr>
           <a:xfrm>
             <a:off x="3009887" y="6103848"/>
-            <a:ext cx="3572538" cy="646331"/>
+            <a:ext cx="3572537" cy="646331"/>
           </a:xfrm>
           <a:prstGeom prst="rect">
             <a:avLst/>
@@ -10107,17 +10107,18 @@
           <a:p>
             <a:pPr algn="ctr"/>
             <a:r>
-              <a:rPr lang="en-US" dirty="0"/>
+              <a:rPr lang="en-US" altLang="zh-CN" b="1" dirty="0"/>
               <a:t>https://</a:t>
             </a:r>
             <a:r>
-              <a:rPr lang="en-US" dirty="0" err="1"/>
+              <a:rPr lang="en-US" altLang="zh-CN" b="1" dirty="0" err="1"/>
               <a:t>goo.gl</a:t>
             </a:r>
             <a:r>
-              <a:rPr lang="en-US" dirty="0"/>
-              <a:t>/2Nr4Ns</a:t>
-            </a:r>
+              <a:rPr lang="en-US" altLang="zh-CN" b="1" dirty="0"/>
+              <a:t>/gu3LvQ</a:t>
+            </a:r>
+            <a:endParaRPr lang="en-US" altLang="zh-CN" b="1" dirty="0" smtClean="0"/>
           </a:p>
         </p:txBody>
       </p:sp>

</xml_diff>